<commit_message>
!!! conflit ? !!!
</commit_message>
<xml_diff>
--- a/documentation/docTravail/seancesTravail/cyber/Simu.pptx
+++ b/documentation/docTravail/seancesTravail/cyber/Simu.pptx
@@ -139,7 +139,7 @@
   </p:defaultTextStyle>
   <p:extLst>
     <p:ext uri="{EFAFB233-063F-42B5-8137-9DF3F51BA10A}">
-      <p15:sldGuideLst xmlns:p15="http://schemas.microsoft.com/office/powerpoint/2012/main" xmlns="">
+      <p15:sldGuideLst xmlns="" xmlns:p15="http://schemas.microsoft.com/office/powerpoint/2012/main">
         <p15:guide id="1" orient="horz" pos="9526">
           <p15:clr>
             <a:srgbClr val="A4A3A4"/>
@@ -263,7 +263,7 @@
               <a:pPr>
                 <a:defRPr/>
               </a:pPr>
-              <a:t>08/04/2016</a:t>
+              <a:t>11/04/2016</a:t>
             </a:fld>
             <a:endParaRPr lang="fr-FR"/>
           </a:p>
@@ -1131,7 +1131,7 @@
               <a:pPr>
                 <a:defRPr/>
               </a:pPr>
-              <a:t>08/04/2016</a:t>
+              <a:t>11/04/2016</a:t>
             </a:fld>
             <a:endParaRPr lang="fr-FR"/>
           </a:p>
@@ -1333,7 +1333,7 @@
               <a:pPr>
                 <a:defRPr/>
               </a:pPr>
-              <a:t>08/04/2016</a:t>
+              <a:t>11/04/2016</a:t>
             </a:fld>
             <a:endParaRPr lang="fr-FR"/>
           </a:p>
@@ -1525,7 +1525,7 @@
               <a:pPr>
                 <a:defRPr/>
               </a:pPr>
-              <a:t>08/04/2016</a:t>
+              <a:t>11/04/2016</a:t>
             </a:fld>
             <a:endParaRPr lang="fr-FR"/>
           </a:p>
@@ -1793,7 +1793,7 @@
               <a:pPr>
                 <a:defRPr/>
               </a:pPr>
-              <a:t>08/04/2016</a:t>
+              <a:t>11/04/2016</a:t>
             </a:fld>
             <a:endParaRPr lang="fr-FR"/>
           </a:p>
@@ -2103,7 +2103,7 @@
               <a:pPr>
                 <a:defRPr/>
               </a:pPr>
-              <a:t>08/04/2016</a:t>
+              <a:t>11/04/2016</a:t>
             </a:fld>
             <a:endParaRPr lang="fr-FR"/>
           </a:p>
@@ -2547,7 +2547,7 @@
               <a:pPr>
                 <a:defRPr/>
               </a:pPr>
-              <a:t>08/04/2016</a:t>
+              <a:t>11/04/2016</a:t>
             </a:fld>
             <a:endParaRPr lang="fr-FR"/>
           </a:p>
@@ -2687,7 +2687,7 @@
               <a:pPr>
                 <a:defRPr/>
               </a:pPr>
-              <a:t>08/04/2016</a:t>
+              <a:t>11/04/2016</a:t>
             </a:fld>
             <a:endParaRPr lang="fr-FR"/>
           </a:p>
@@ -2804,7 +2804,7 @@
               <a:pPr>
                 <a:defRPr/>
               </a:pPr>
-              <a:t>08/04/2016</a:t>
+              <a:t>11/04/2016</a:t>
             </a:fld>
             <a:endParaRPr lang="fr-FR"/>
           </a:p>
@@ -3103,7 +3103,7 @@
               <a:pPr>
                 <a:defRPr/>
               </a:pPr>
-              <a:t>08/04/2016</a:t>
+              <a:t>11/04/2016</a:t>
             </a:fld>
             <a:endParaRPr lang="fr-FR"/>
           </a:p>
@@ -3381,7 +3381,7 @@
               <a:pPr>
                 <a:defRPr/>
               </a:pPr>
-              <a:t>08/04/2016</a:t>
+              <a:t>11/04/2016</a:t>
             </a:fld>
             <a:endParaRPr lang="fr-FR"/>
           </a:p>
@@ -3636,7 +3636,7 @@
               <a:pPr>
                 <a:defRPr/>
               </a:pPr>
-              <a:t>08/04/2016</a:t>
+              <a:t>11/04/2016</a:t>
             </a:fld>
             <a:endParaRPr lang="fr-FR"/>
           </a:p>
@@ -6815,13 +6815,13 @@
           <a:p>
             <a:pPr algn="ctr"/>
             <a:r>
-              <a:rPr lang="en-US" b="1" dirty="0" smtClean="0">
+              <a:rPr lang="en-US" b="1" smtClean="0">
                 <a:solidFill>
                   <a:schemeClr val="tx1"/>
                 </a:solidFill>
                 <a:latin typeface="Agency FB" panose="020B0503020202020204" pitchFamily="34" charset="0"/>
               </a:rPr>
-              <a:t>Morphose</a:t>
+              <a:t>NewAge</a:t>
             </a:r>
             <a:endParaRPr lang="en-US" b="1" dirty="0">
               <a:solidFill>

</xml_diff>